<commit_message>
Revise filter_kadai2 and result
</commit_message>
<xml_diff>
--- a/MATLAB/result.pptx
+++ b/MATLAB/result.pptx
@@ -108,6 +108,11 @@
       </a:defRPr>
     </a:lvl9pPr>
   </p:defaultTextStyle>
+  <p:extLst>
+    <p:ext uri="{EFAFB233-063F-42B5-8137-9DF3F51BA10A}">
+      <p15:sldGuideLst xmlns:p15="http://schemas.microsoft.com/office/powerpoint/2012/main"/>
+    </p:ext>
+  </p:extLst>
 </p:presentation>
 </file>
 
@@ -258,7 +263,7 @@
           <a:p>
             <a:fld id="{F11D07F4-F5B0-454C-8DC1-2358A34DEBD1}" type="datetimeFigureOut">
               <a:rPr kumimoji="1" lang="ja-JP" altLang="en-US" smtClean="0"/>
-              <a:t>2020/4/7</a:t>
+              <a:t>2020/4/9</a:t>
             </a:fld>
             <a:endParaRPr kumimoji="1" lang="ja-JP" altLang="en-US"/>
           </a:p>
@@ -488,7 +493,7 @@
           <a:p>
             <a:fld id="{F11D07F4-F5B0-454C-8DC1-2358A34DEBD1}" type="datetimeFigureOut">
               <a:rPr kumimoji="1" lang="ja-JP" altLang="en-US" smtClean="0"/>
-              <a:t>2020/4/7</a:t>
+              <a:t>2020/4/9</a:t>
             </a:fld>
             <a:endParaRPr kumimoji="1" lang="ja-JP" altLang="en-US"/>
           </a:p>
@@ -728,7 +733,7 @@
           <a:p>
             <a:fld id="{F11D07F4-F5B0-454C-8DC1-2358A34DEBD1}" type="datetimeFigureOut">
               <a:rPr kumimoji="1" lang="ja-JP" altLang="en-US" smtClean="0"/>
-              <a:t>2020/4/7</a:t>
+              <a:t>2020/4/9</a:t>
             </a:fld>
             <a:endParaRPr kumimoji="1" lang="ja-JP" altLang="en-US"/>
           </a:p>
@@ -958,7 +963,7 @@
           <a:p>
             <a:fld id="{F11D07F4-F5B0-454C-8DC1-2358A34DEBD1}" type="datetimeFigureOut">
               <a:rPr kumimoji="1" lang="ja-JP" altLang="en-US" smtClean="0"/>
-              <a:t>2020/4/7</a:t>
+              <a:t>2020/4/9</a:t>
             </a:fld>
             <a:endParaRPr kumimoji="1" lang="ja-JP" altLang="en-US"/>
           </a:p>
@@ -1233,7 +1238,7 @@
           <a:p>
             <a:fld id="{F11D07F4-F5B0-454C-8DC1-2358A34DEBD1}" type="datetimeFigureOut">
               <a:rPr kumimoji="1" lang="ja-JP" altLang="en-US" smtClean="0"/>
-              <a:t>2020/4/7</a:t>
+              <a:t>2020/4/9</a:t>
             </a:fld>
             <a:endParaRPr kumimoji="1" lang="ja-JP" altLang="en-US"/>
           </a:p>
@@ -1562,7 +1567,7 @@
           <a:p>
             <a:fld id="{F11D07F4-F5B0-454C-8DC1-2358A34DEBD1}" type="datetimeFigureOut">
               <a:rPr kumimoji="1" lang="ja-JP" altLang="en-US" smtClean="0"/>
-              <a:t>2020/4/7</a:t>
+              <a:t>2020/4/9</a:t>
             </a:fld>
             <a:endParaRPr kumimoji="1" lang="ja-JP" altLang="en-US"/>
           </a:p>
@@ -2038,7 +2043,7 @@
           <a:p>
             <a:fld id="{F11D07F4-F5B0-454C-8DC1-2358A34DEBD1}" type="datetimeFigureOut">
               <a:rPr kumimoji="1" lang="ja-JP" altLang="en-US" smtClean="0"/>
-              <a:t>2020/4/7</a:t>
+              <a:t>2020/4/9</a:t>
             </a:fld>
             <a:endParaRPr kumimoji="1" lang="ja-JP" altLang="en-US"/>
           </a:p>
@@ -2179,7 +2184,7 @@
           <a:p>
             <a:fld id="{F11D07F4-F5B0-454C-8DC1-2358A34DEBD1}" type="datetimeFigureOut">
               <a:rPr kumimoji="1" lang="ja-JP" altLang="en-US" smtClean="0"/>
-              <a:t>2020/4/7</a:t>
+              <a:t>2020/4/9</a:t>
             </a:fld>
             <a:endParaRPr kumimoji="1" lang="ja-JP" altLang="en-US"/>
           </a:p>
@@ -2292,7 +2297,7 @@
           <a:p>
             <a:fld id="{F11D07F4-F5B0-454C-8DC1-2358A34DEBD1}" type="datetimeFigureOut">
               <a:rPr kumimoji="1" lang="ja-JP" altLang="en-US" smtClean="0"/>
-              <a:t>2020/4/7</a:t>
+              <a:t>2020/4/9</a:t>
             </a:fld>
             <a:endParaRPr kumimoji="1" lang="ja-JP" altLang="en-US"/>
           </a:p>
@@ -2635,7 +2640,7 @@
           <a:p>
             <a:fld id="{F11D07F4-F5B0-454C-8DC1-2358A34DEBD1}" type="datetimeFigureOut">
               <a:rPr kumimoji="1" lang="ja-JP" altLang="en-US" smtClean="0"/>
-              <a:t>2020/4/7</a:t>
+              <a:t>2020/4/9</a:t>
             </a:fld>
             <a:endParaRPr kumimoji="1" lang="ja-JP" altLang="en-US"/>
           </a:p>
@@ -2923,7 +2928,7 @@
           <a:p>
             <a:fld id="{F11D07F4-F5B0-454C-8DC1-2358A34DEBD1}" type="datetimeFigureOut">
               <a:rPr kumimoji="1" lang="ja-JP" altLang="en-US" smtClean="0"/>
-              <a:t>2020/4/7</a:t>
+              <a:t>2020/4/9</a:t>
             </a:fld>
             <a:endParaRPr kumimoji="1" lang="ja-JP" altLang="en-US"/>
           </a:p>
@@ -3196,7 +3201,7 @@
           <a:p>
             <a:fld id="{F11D07F4-F5B0-454C-8DC1-2358A34DEBD1}" type="datetimeFigureOut">
               <a:rPr kumimoji="1" lang="ja-JP" altLang="en-US" smtClean="0"/>
-              <a:t>2020/4/7</a:t>
+              <a:t>2020/4/9</a:t>
             </a:fld>
             <a:endParaRPr kumimoji="1" lang="ja-JP" altLang="en-US"/>
           </a:p>
@@ -4464,10 +4469,10 @@
       </p:sp>
       <p:pic>
         <p:nvPicPr>
-          <p:cNvPr id="3" name="図 2">
-            <a:extLst>
-              <a:ext uri="{FF2B5EF4-FFF2-40B4-BE49-F238E27FC236}">
-                <a16:creationId xmlns:a16="http://schemas.microsoft.com/office/drawing/2014/main" id="{9A9C066F-2BBB-40E8-BDCB-D9861856E5B9}"/>
+          <p:cNvPr id="4" name="図 3">
+            <a:extLst>
+              <a:ext uri="{FF2B5EF4-FFF2-40B4-BE49-F238E27FC236}">
+                <a16:creationId xmlns:a16="http://schemas.microsoft.com/office/drawing/2014/main" id="{7E6C3152-D651-4BD3-B1AA-0151C431F50B}"/>
               </a:ext>
             </a:extLst>
           </p:cNvPr>
@@ -4484,7 +4489,7 @@
         </p:blipFill>
         <p:spPr>
           <a:xfrm>
-            <a:off x="3429000" y="2055602"/>
+            <a:off x="3428999" y="1823079"/>
             <a:ext cx="5334000" cy="4000500"/>
           </a:xfrm>
           <a:prstGeom prst="rect">

</xml_diff>